<commit_message>
Update the system design section.
</commit_message>
<xml_diff>
--- a/doc/designDoc.pptx
+++ b/doc/designDoc.pptx
@@ -4,9 +4,13 @@
   <p:sldMasterIdLst>
     <p:sldMasterId id="2147483648" r:id="rId1"/>
   </p:sldMasterIdLst>
+  <p:notesMasterIdLst>
+    <p:notesMasterId r:id="rId5"/>
+  </p:notesMasterIdLst>
   <p:sldIdLst>
     <p:sldId id="256" r:id="rId2"/>
-    <p:sldId id="257" r:id="rId3"/>
+    <p:sldId id="260" r:id="rId3"/>
+    <p:sldId id="257" r:id="rId4"/>
   </p:sldIdLst>
   <p:sldSz cx="12192000" cy="6858000"/>
   <p:notesSz cx="6858000" cy="9144000"/>
@@ -111,6 +115,440 @@
     </p:ext>
   </p:extLst>
 </p:presentation>
+</file>
+
+<file path=ppt/notesMasters/notesMaster1.xml><?xml version="1.0" encoding="utf-8"?>
+<p:notesMaster xmlns:a="http://schemas.openxmlformats.org/drawingml/2006/main" xmlns:r="http://schemas.openxmlformats.org/officeDocument/2006/relationships" xmlns:p="http://schemas.openxmlformats.org/presentationml/2006/main">
+  <p:cSld>
+    <p:bg>
+      <p:bgRef idx="1001">
+        <a:schemeClr val="bg1"/>
+      </p:bgRef>
+    </p:bg>
+    <p:spTree>
+      <p:nvGrpSpPr>
+        <p:cNvPr id="1" name=""/>
+        <p:cNvGrpSpPr/>
+        <p:nvPr/>
+      </p:nvGrpSpPr>
+      <p:grpSpPr>
+        <a:xfrm>
+          <a:off x="0" y="0"/>
+          <a:ext cx="0" cy="0"/>
+          <a:chOff x="0" y="0"/>
+          <a:chExt cx="0" cy="0"/>
+        </a:xfrm>
+      </p:grpSpPr>
+      <p:sp>
+        <p:nvSpPr>
+          <p:cNvPr id="2" name="Header Placeholder 1"/>
+          <p:cNvSpPr>
+            <a:spLocks noGrp="1"/>
+          </p:cNvSpPr>
+          <p:nvPr>
+            <p:ph type="hdr" sz="quarter"/>
+          </p:nvPr>
+        </p:nvSpPr>
+        <p:spPr>
+          <a:xfrm>
+            <a:off x="0" y="0"/>
+            <a:ext cx="2971800" cy="458788"/>
+          </a:xfrm>
+          <a:prstGeom prst="rect">
+            <a:avLst/>
+          </a:prstGeom>
+        </p:spPr>
+        <p:txBody>
+          <a:bodyPr vert="horz" lIns="91440" tIns="45720" rIns="91440" bIns="45720" rtlCol="0"/>
+          <a:lstStyle>
+            <a:lvl1pPr algn="l">
+              <a:defRPr sz="1200"/>
+            </a:lvl1pPr>
+          </a:lstStyle>
+          <a:p>
+            <a:endParaRPr lang="en-SG"/>
+          </a:p>
+        </p:txBody>
+      </p:sp>
+      <p:sp>
+        <p:nvSpPr>
+          <p:cNvPr id="3" name="Date Placeholder 2"/>
+          <p:cNvSpPr>
+            <a:spLocks noGrp="1"/>
+          </p:cNvSpPr>
+          <p:nvPr>
+            <p:ph type="dt" idx="1"/>
+          </p:nvPr>
+        </p:nvSpPr>
+        <p:spPr>
+          <a:xfrm>
+            <a:off x="3884613" y="0"/>
+            <a:ext cx="2971800" cy="458788"/>
+          </a:xfrm>
+          <a:prstGeom prst="rect">
+            <a:avLst/>
+          </a:prstGeom>
+        </p:spPr>
+        <p:txBody>
+          <a:bodyPr vert="horz" lIns="91440" tIns="45720" rIns="91440" bIns="45720" rtlCol="0"/>
+          <a:lstStyle>
+            <a:lvl1pPr algn="r">
+              <a:defRPr sz="1200"/>
+            </a:lvl1pPr>
+          </a:lstStyle>
+          <a:p>
+            <a:fld id="{72F4136D-337C-4C0B-8508-D89D13D83872}" type="datetimeFigureOut">
+              <a:rPr lang="en-SG" smtClean="0"/>
+              <a:t>3/2/2026</a:t>
+            </a:fld>
+            <a:endParaRPr lang="en-SG"/>
+          </a:p>
+        </p:txBody>
+      </p:sp>
+      <p:sp>
+        <p:nvSpPr>
+          <p:cNvPr id="4" name="Slide Image Placeholder 3"/>
+          <p:cNvSpPr>
+            <a:spLocks noGrp="1" noRot="1" noChangeAspect="1"/>
+          </p:cNvSpPr>
+          <p:nvPr>
+            <p:ph type="sldImg" idx="2"/>
+          </p:nvPr>
+        </p:nvSpPr>
+        <p:spPr>
+          <a:xfrm>
+            <a:off x="685800" y="1143000"/>
+            <a:ext cx="5486400" cy="3086100"/>
+          </a:xfrm>
+          <a:prstGeom prst="rect">
+            <a:avLst/>
+          </a:prstGeom>
+          <a:noFill/>
+          <a:ln w="12700">
+            <a:solidFill>
+              <a:prstClr val="black"/>
+            </a:solidFill>
+          </a:ln>
+        </p:spPr>
+        <p:txBody>
+          <a:bodyPr vert="horz" lIns="91440" tIns="45720" rIns="91440" bIns="45720" rtlCol="0" anchor="ctr"/>
+          <a:lstStyle/>
+          <a:p>
+            <a:endParaRPr lang="en-SG"/>
+          </a:p>
+        </p:txBody>
+      </p:sp>
+      <p:sp>
+        <p:nvSpPr>
+          <p:cNvPr id="5" name="Notes Placeholder 4"/>
+          <p:cNvSpPr>
+            <a:spLocks noGrp="1"/>
+          </p:cNvSpPr>
+          <p:nvPr>
+            <p:ph type="body" sz="quarter" idx="3"/>
+          </p:nvPr>
+        </p:nvSpPr>
+        <p:spPr>
+          <a:xfrm>
+            <a:off x="685800" y="4400550"/>
+            <a:ext cx="5486400" cy="3600450"/>
+          </a:xfrm>
+          <a:prstGeom prst="rect">
+            <a:avLst/>
+          </a:prstGeom>
+        </p:spPr>
+        <p:txBody>
+          <a:bodyPr vert="horz" lIns="91440" tIns="45720" rIns="91440" bIns="45720" rtlCol="0"/>
+          <a:lstStyle/>
+          <a:p>
+            <a:pPr lvl="0"/>
+            <a:r>
+              <a:rPr lang="en-US"/>
+              <a:t>Click to edit Master text styles</a:t>
+            </a:r>
+          </a:p>
+          <a:p>
+            <a:pPr lvl="1"/>
+            <a:r>
+              <a:rPr lang="en-US"/>
+              <a:t>Second level</a:t>
+            </a:r>
+          </a:p>
+          <a:p>
+            <a:pPr lvl="2"/>
+            <a:r>
+              <a:rPr lang="en-US"/>
+              <a:t>Third level</a:t>
+            </a:r>
+          </a:p>
+          <a:p>
+            <a:pPr lvl="3"/>
+            <a:r>
+              <a:rPr lang="en-US"/>
+              <a:t>Fourth level</a:t>
+            </a:r>
+          </a:p>
+          <a:p>
+            <a:pPr lvl="4"/>
+            <a:r>
+              <a:rPr lang="en-US"/>
+              <a:t>Fifth level</a:t>
+            </a:r>
+            <a:endParaRPr lang="en-SG"/>
+          </a:p>
+        </p:txBody>
+      </p:sp>
+      <p:sp>
+        <p:nvSpPr>
+          <p:cNvPr id="6" name="Footer Placeholder 5"/>
+          <p:cNvSpPr>
+            <a:spLocks noGrp="1"/>
+          </p:cNvSpPr>
+          <p:nvPr>
+            <p:ph type="ftr" sz="quarter" idx="4"/>
+          </p:nvPr>
+        </p:nvSpPr>
+        <p:spPr>
+          <a:xfrm>
+            <a:off x="0" y="8685213"/>
+            <a:ext cx="2971800" cy="458787"/>
+          </a:xfrm>
+          <a:prstGeom prst="rect">
+            <a:avLst/>
+          </a:prstGeom>
+        </p:spPr>
+        <p:txBody>
+          <a:bodyPr vert="horz" lIns="91440" tIns="45720" rIns="91440" bIns="45720" rtlCol="0" anchor="b"/>
+          <a:lstStyle>
+            <a:lvl1pPr algn="l">
+              <a:defRPr sz="1200"/>
+            </a:lvl1pPr>
+          </a:lstStyle>
+          <a:p>
+            <a:endParaRPr lang="en-SG"/>
+          </a:p>
+        </p:txBody>
+      </p:sp>
+      <p:sp>
+        <p:nvSpPr>
+          <p:cNvPr id="7" name="Slide Number Placeholder 6"/>
+          <p:cNvSpPr>
+            <a:spLocks noGrp="1"/>
+          </p:cNvSpPr>
+          <p:nvPr>
+            <p:ph type="sldNum" sz="quarter" idx="5"/>
+          </p:nvPr>
+        </p:nvSpPr>
+        <p:spPr>
+          <a:xfrm>
+            <a:off x="3884613" y="8685213"/>
+            <a:ext cx="2971800" cy="458787"/>
+          </a:xfrm>
+          <a:prstGeom prst="rect">
+            <a:avLst/>
+          </a:prstGeom>
+        </p:spPr>
+        <p:txBody>
+          <a:bodyPr vert="horz" lIns="91440" tIns="45720" rIns="91440" bIns="45720" rtlCol="0" anchor="b"/>
+          <a:lstStyle>
+            <a:lvl1pPr algn="r">
+              <a:defRPr sz="1200"/>
+            </a:lvl1pPr>
+          </a:lstStyle>
+          <a:p>
+            <a:fld id="{1AF7C66F-CB69-40F3-9F02-5D7E1421E2E2}" type="slidenum">
+              <a:rPr lang="en-SG" smtClean="0"/>
+              <a:t>‹#›</a:t>
+            </a:fld>
+            <a:endParaRPr lang="en-SG"/>
+          </a:p>
+        </p:txBody>
+      </p:sp>
+    </p:spTree>
+    <p:extLst>
+      <p:ext uri="{BB962C8B-B14F-4D97-AF65-F5344CB8AC3E}">
+        <p14:creationId xmlns:p14="http://schemas.microsoft.com/office/powerpoint/2010/main" val="3994358278"/>
+      </p:ext>
+    </p:extLst>
+  </p:cSld>
+  <p:clrMap bg1="lt1" tx1="dk1" bg2="lt2" tx2="dk2" accent1="accent1" accent2="accent2" accent3="accent3" accent4="accent4" accent5="accent5" accent6="accent6" hlink="hlink" folHlink="folHlink"/>
+  <p:notesStyle>
+    <a:lvl1pPr marL="0" algn="l" defTabSz="914400" rtl="0" eaLnBrk="1" latinLnBrk="0" hangingPunct="1">
+      <a:defRPr sz="1200" kern="1200">
+        <a:solidFill>
+          <a:schemeClr val="tx1"/>
+        </a:solidFill>
+        <a:latin typeface="+mn-lt"/>
+        <a:ea typeface="+mn-ea"/>
+        <a:cs typeface="+mn-cs"/>
+      </a:defRPr>
+    </a:lvl1pPr>
+    <a:lvl2pPr marL="457200" algn="l" defTabSz="914400" rtl="0" eaLnBrk="1" latinLnBrk="0" hangingPunct="1">
+      <a:defRPr sz="1200" kern="1200">
+        <a:solidFill>
+          <a:schemeClr val="tx1"/>
+        </a:solidFill>
+        <a:latin typeface="+mn-lt"/>
+        <a:ea typeface="+mn-ea"/>
+        <a:cs typeface="+mn-cs"/>
+      </a:defRPr>
+    </a:lvl2pPr>
+    <a:lvl3pPr marL="914400" algn="l" defTabSz="914400" rtl="0" eaLnBrk="1" latinLnBrk="0" hangingPunct="1">
+      <a:defRPr sz="1200" kern="1200">
+        <a:solidFill>
+          <a:schemeClr val="tx1"/>
+        </a:solidFill>
+        <a:latin typeface="+mn-lt"/>
+        <a:ea typeface="+mn-ea"/>
+        <a:cs typeface="+mn-cs"/>
+      </a:defRPr>
+    </a:lvl3pPr>
+    <a:lvl4pPr marL="1371600" algn="l" defTabSz="914400" rtl="0" eaLnBrk="1" latinLnBrk="0" hangingPunct="1">
+      <a:defRPr sz="1200" kern="1200">
+        <a:solidFill>
+          <a:schemeClr val="tx1"/>
+        </a:solidFill>
+        <a:latin typeface="+mn-lt"/>
+        <a:ea typeface="+mn-ea"/>
+        <a:cs typeface="+mn-cs"/>
+      </a:defRPr>
+    </a:lvl4pPr>
+    <a:lvl5pPr marL="1828800" algn="l" defTabSz="914400" rtl="0" eaLnBrk="1" latinLnBrk="0" hangingPunct="1">
+      <a:defRPr sz="1200" kern="1200">
+        <a:solidFill>
+          <a:schemeClr val="tx1"/>
+        </a:solidFill>
+        <a:latin typeface="+mn-lt"/>
+        <a:ea typeface="+mn-ea"/>
+        <a:cs typeface="+mn-cs"/>
+      </a:defRPr>
+    </a:lvl5pPr>
+    <a:lvl6pPr marL="2286000" algn="l" defTabSz="914400" rtl="0" eaLnBrk="1" latinLnBrk="0" hangingPunct="1">
+      <a:defRPr sz="1200" kern="1200">
+        <a:solidFill>
+          <a:schemeClr val="tx1"/>
+        </a:solidFill>
+        <a:latin typeface="+mn-lt"/>
+        <a:ea typeface="+mn-ea"/>
+        <a:cs typeface="+mn-cs"/>
+      </a:defRPr>
+    </a:lvl6pPr>
+    <a:lvl7pPr marL="2743200" algn="l" defTabSz="914400" rtl="0" eaLnBrk="1" latinLnBrk="0" hangingPunct="1">
+      <a:defRPr sz="1200" kern="1200">
+        <a:solidFill>
+          <a:schemeClr val="tx1"/>
+        </a:solidFill>
+        <a:latin typeface="+mn-lt"/>
+        <a:ea typeface="+mn-ea"/>
+        <a:cs typeface="+mn-cs"/>
+      </a:defRPr>
+    </a:lvl7pPr>
+    <a:lvl8pPr marL="3200400" algn="l" defTabSz="914400" rtl="0" eaLnBrk="1" latinLnBrk="0" hangingPunct="1">
+      <a:defRPr sz="1200" kern="1200">
+        <a:solidFill>
+          <a:schemeClr val="tx1"/>
+        </a:solidFill>
+        <a:latin typeface="+mn-lt"/>
+        <a:ea typeface="+mn-ea"/>
+        <a:cs typeface="+mn-cs"/>
+      </a:defRPr>
+    </a:lvl8pPr>
+    <a:lvl9pPr marL="3657600" algn="l" defTabSz="914400" rtl="0" eaLnBrk="1" latinLnBrk="0" hangingPunct="1">
+      <a:defRPr sz="1200" kern="1200">
+        <a:solidFill>
+          <a:schemeClr val="tx1"/>
+        </a:solidFill>
+        <a:latin typeface="+mn-lt"/>
+        <a:ea typeface="+mn-ea"/>
+        <a:cs typeface="+mn-cs"/>
+      </a:defRPr>
+    </a:lvl9pPr>
+  </p:notesStyle>
+</p:notesMaster>
+</file>
+
+<file path=ppt/notesSlides/notesSlide1.xml><?xml version="1.0" encoding="utf-8"?>
+<p:notes xmlns:a="http://schemas.openxmlformats.org/drawingml/2006/main" xmlns:r="http://schemas.openxmlformats.org/officeDocument/2006/relationships" xmlns:p="http://schemas.openxmlformats.org/presentationml/2006/main">
+  <p:cSld>
+    <p:spTree>
+      <p:nvGrpSpPr>
+        <p:cNvPr id="1" name=""/>
+        <p:cNvGrpSpPr/>
+        <p:nvPr/>
+      </p:nvGrpSpPr>
+      <p:grpSpPr>
+        <a:xfrm>
+          <a:off x="0" y="0"/>
+          <a:ext cx="0" cy="0"/>
+          <a:chOff x="0" y="0"/>
+          <a:chExt cx="0" cy="0"/>
+        </a:xfrm>
+      </p:grpSpPr>
+      <p:sp>
+        <p:nvSpPr>
+          <p:cNvPr id="2" name="Slide Image Placeholder 1"/>
+          <p:cNvSpPr>
+            <a:spLocks noGrp="1" noRot="1" noChangeAspect="1"/>
+          </p:cNvSpPr>
+          <p:nvPr>
+            <p:ph type="sldImg"/>
+          </p:nvPr>
+        </p:nvSpPr>
+        <p:spPr/>
+      </p:sp>
+      <p:sp>
+        <p:nvSpPr>
+          <p:cNvPr id="3" name="Notes Placeholder 2"/>
+          <p:cNvSpPr>
+            <a:spLocks noGrp="1"/>
+          </p:cNvSpPr>
+          <p:nvPr>
+            <p:ph type="body" idx="1"/>
+          </p:nvPr>
+        </p:nvSpPr>
+        <p:spPr/>
+        <p:txBody>
+          <a:bodyPr/>
+          <a:lstStyle/>
+          <a:p>
+            <a:endParaRPr lang="en-SG" dirty="0"/>
+          </a:p>
+        </p:txBody>
+      </p:sp>
+      <p:sp>
+        <p:nvSpPr>
+          <p:cNvPr id="4" name="Slide Number Placeholder 3"/>
+          <p:cNvSpPr>
+            <a:spLocks noGrp="1"/>
+          </p:cNvSpPr>
+          <p:nvPr>
+            <p:ph type="sldNum" sz="quarter" idx="5"/>
+          </p:nvPr>
+        </p:nvSpPr>
+        <p:spPr/>
+        <p:txBody>
+          <a:bodyPr/>
+          <a:lstStyle/>
+          <a:p>
+            <a:fld id="{A1A7AD2C-A1CB-4D37-A2CF-FED7AB444762}" type="slidenum">
+              <a:rPr lang="en-SG" smtClean="0"/>
+              <a:t>2</a:t>
+            </a:fld>
+            <a:endParaRPr lang="en-SG"/>
+          </a:p>
+        </p:txBody>
+      </p:sp>
+    </p:spTree>
+    <p:extLst>
+      <p:ext uri="{BB962C8B-B14F-4D97-AF65-F5344CB8AC3E}">
+        <p14:creationId xmlns:p14="http://schemas.microsoft.com/office/powerpoint/2010/main" val="1519926775"/>
+      </p:ext>
+    </p:extLst>
+  </p:cSld>
+  <p:clrMapOvr>
+    <a:masterClrMapping/>
+  </p:clrMapOvr>
+</p:notes>
 </file>
 
 <file path=ppt/slideLayouts/slideLayout1.xml><?xml version="1.0" encoding="utf-8"?>
@@ -7223,6 +7661,1045 @@
           <a:chExt cx="0" cy="0"/>
         </a:xfrm>
       </p:grpSpPr>
+      <p:sp>
+        <p:nvSpPr>
+          <p:cNvPr id="2" name="TextBox 1">
+            <a:extLst>
+              <a:ext uri="{FF2B5EF4-FFF2-40B4-BE49-F238E27FC236}">
+                <a16:creationId xmlns:a16="http://schemas.microsoft.com/office/drawing/2014/main" id="{44148C6C-6039-424D-6A60-91A69DCABE03}"/>
+              </a:ext>
+            </a:extLst>
+          </p:cNvPr>
+          <p:cNvSpPr txBox="1"/>
+          <p:nvPr/>
+        </p:nvSpPr>
+        <p:spPr>
+          <a:xfrm>
+            <a:off x="1" y="-58547"/>
+            <a:ext cx="12191999" cy="461665"/>
+          </a:xfrm>
+          <a:prstGeom prst="rect">
+            <a:avLst/>
+          </a:prstGeom>
+          <a:solidFill>
+            <a:schemeClr val="accent1">
+              <a:lumMod val="75000"/>
+            </a:schemeClr>
+          </a:solidFill>
+          <a:ln>
+            <a:solidFill>
+              <a:schemeClr val="tx1"/>
+            </a:solidFill>
+          </a:ln>
+        </p:spPr>
+        <p:txBody>
+          <a:bodyPr wrap="square" rtlCol="0">
+            <a:spAutoFit/>
+          </a:bodyPr>
+          <a:lstStyle/>
+          <a:p>
+            <a:r>
+              <a:rPr lang="en-US" sz="2400" dirty="0">
+                <a:solidFill>
+                  <a:schemeClr val="bg1"/>
+                </a:solidFill>
+              </a:rPr>
+              <a:t>Use Case 1: </a:t>
+            </a:r>
+            <a:r>
+              <a:rPr lang="en-US" sz="2400" dirty="0" err="1">
+                <a:solidFill>
+                  <a:schemeClr val="bg1"/>
+                </a:solidFill>
+              </a:rPr>
+              <a:t>CIDeX</a:t>
+            </a:r>
+            <a:r>
+              <a:rPr lang="en-US" sz="2400" dirty="0">
+                <a:solidFill>
+                  <a:schemeClr val="bg1"/>
+                </a:solidFill>
+              </a:rPr>
+              <a:t> event main venue network monitor [result]</a:t>
+            </a:r>
+            <a:endParaRPr lang="en-SG" sz="2400" dirty="0">
+              <a:solidFill>
+                <a:srgbClr val="FF0000"/>
+              </a:solidFill>
+            </a:endParaRPr>
+          </a:p>
+        </p:txBody>
+      </p:sp>
+      <p:pic>
+        <p:nvPicPr>
+          <p:cNvPr id="3" name="Picture 2" descr="Graphical user interface, text&#10;&#10;Description automatically generated with medium confidence">
+            <a:extLst>
+              <a:ext uri="{FF2B5EF4-FFF2-40B4-BE49-F238E27FC236}">
+                <a16:creationId xmlns:a16="http://schemas.microsoft.com/office/drawing/2014/main" id="{E159DD4E-ECC1-C44B-424E-1C530552851B}"/>
+              </a:ext>
+            </a:extLst>
+          </p:cNvPr>
+          <p:cNvPicPr>
+            <a:picLocks noChangeAspect="1"/>
+          </p:cNvPicPr>
+          <p:nvPr/>
+        </p:nvPicPr>
+        <p:blipFill>
+          <a:blip r:embed="rId3">
+            <a:extLst>
+              <a:ext uri="{28A0092B-C50C-407E-A947-70E740481C1C}">
+                <a14:useLocalDpi xmlns:a14="http://schemas.microsoft.com/office/drawing/2010/main" val="0"/>
+              </a:ext>
+            </a:extLst>
+          </a:blip>
+          <a:stretch>
+            <a:fillRect/>
+          </a:stretch>
+        </p:blipFill>
+        <p:spPr>
+          <a:xfrm>
+            <a:off x="10447732" y="-12288"/>
+            <a:ext cx="1696767" cy="369686"/>
+          </a:xfrm>
+          <a:prstGeom prst="rect">
+            <a:avLst/>
+          </a:prstGeom>
+        </p:spPr>
+      </p:pic>
+      <p:sp>
+        <p:nvSpPr>
+          <p:cNvPr id="4" name="TextBox 3">
+            <a:extLst>
+              <a:ext uri="{FF2B5EF4-FFF2-40B4-BE49-F238E27FC236}">
+                <a16:creationId xmlns:a16="http://schemas.microsoft.com/office/drawing/2014/main" id="{81686E90-A13B-427A-9FC2-B95007B10872}"/>
+              </a:ext>
+            </a:extLst>
+          </p:cNvPr>
+          <p:cNvSpPr txBox="1"/>
+          <p:nvPr/>
+        </p:nvSpPr>
+        <p:spPr>
+          <a:xfrm>
+            <a:off x="5248760" y="711001"/>
+            <a:ext cx="5367423" cy="1446550"/>
+          </a:xfrm>
+          <a:prstGeom prst="rect">
+            <a:avLst/>
+          </a:prstGeom>
+          <a:noFill/>
+        </p:spPr>
+        <p:txBody>
+          <a:bodyPr wrap="square" rtlCol="0">
+            <a:spAutoFit/>
+          </a:bodyPr>
+          <a:lstStyle/>
+          <a:p>
+            <a:pPr algn="just"/>
+            <a:r>
+              <a:rPr lang="en-SG" sz="1600" b="1" dirty="0"/>
+              <a:t>Event monitor result</a:t>
+            </a:r>
+            <a:r>
+              <a:rPr lang="en-SG" sz="1600" dirty="0"/>
+              <a:t>:</a:t>
+            </a:r>
+          </a:p>
+          <a:p>
+            <a:pPr algn="just"/>
+            <a:endParaRPr lang="en-SG" sz="1600" dirty="0"/>
+          </a:p>
+          <a:p>
+            <a:pPr marL="285750" indent="-285750" algn="just">
+              <a:buFont typeface="Arial" panose="020B0604020202020204" pitchFamily="34" charset="0"/>
+              <a:buChar char="•"/>
+            </a:pPr>
+            <a:r>
+              <a:rPr lang="en-SG" sz="1400" dirty="0"/>
+              <a:t>Ping client: 900KB raw ping record [text format].</a:t>
+            </a:r>
+          </a:p>
+          <a:p>
+            <a:pPr marL="285750" indent="-285750" algn="just">
+              <a:buFont typeface="Arial" panose="020B0604020202020204" pitchFamily="34" charset="0"/>
+              <a:buChar char="•"/>
+            </a:pPr>
+            <a:r>
+              <a:rPr lang="en-SG" sz="1400" dirty="0"/>
+              <a:t>Monitor hub: 600K DB raw + </a:t>
+            </a:r>
+            <a:r>
+              <a:rPr lang="en-SG" sz="1400" dirty="0" err="1"/>
+              <a:t>avg</a:t>
+            </a:r>
+            <a:r>
+              <a:rPr lang="en-SG" sz="1400" dirty="0"/>
+              <a:t> data, 1 network interrupt detect and reported.</a:t>
+            </a:r>
+          </a:p>
+          <a:p>
+            <a:pPr marL="285750" indent="-285750" algn="just">
+              <a:buFont typeface="Arial" panose="020B0604020202020204" pitchFamily="34" charset="0"/>
+              <a:buChar char="•"/>
+            </a:pPr>
+            <a:r>
+              <a:rPr lang="en-SG" sz="1400" dirty="0"/>
+              <a:t>Telegram-bot: 197 </a:t>
+            </a:r>
+            <a:r>
+              <a:rPr lang="en-SG" sz="1400" dirty="0" err="1"/>
+              <a:t>avg</a:t>
+            </a:r>
+            <a:r>
+              <a:rPr lang="en-SG" sz="1400" dirty="0"/>
+              <a:t> ping report in the channel.  </a:t>
+            </a:r>
+          </a:p>
+        </p:txBody>
+      </p:sp>
+      <p:pic>
+        <p:nvPicPr>
+          <p:cNvPr id="11" name="Picture 10" descr="A screenshot of a computer&#10;&#10;Description automatically generated with medium confidence">
+            <a:extLst>
+              <a:ext uri="{FF2B5EF4-FFF2-40B4-BE49-F238E27FC236}">
+                <a16:creationId xmlns:a16="http://schemas.microsoft.com/office/drawing/2014/main" id="{202C6361-3E14-6C30-9E23-CDEFB2906507}"/>
+              </a:ext>
+            </a:extLst>
+          </p:cNvPr>
+          <p:cNvPicPr>
+            <a:picLocks noChangeAspect="1"/>
+          </p:cNvPicPr>
+          <p:nvPr/>
+        </p:nvPicPr>
+        <p:blipFill>
+          <a:blip r:embed="rId4">
+            <a:extLst>
+              <a:ext uri="{28A0092B-C50C-407E-A947-70E740481C1C}">
+                <a14:useLocalDpi xmlns:a14="http://schemas.microsoft.com/office/drawing/2010/main" val="0"/>
+              </a:ext>
+            </a:extLst>
+          </a:blip>
+          <a:stretch>
+            <a:fillRect/>
+          </a:stretch>
+        </p:blipFill>
+        <p:spPr>
+          <a:xfrm>
+            <a:off x="307560" y="1108891"/>
+            <a:ext cx="4727588" cy="2560777"/>
+          </a:xfrm>
+          <a:prstGeom prst="rect">
+            <a:avLst/>
+          </a:prstGeom>
+          <a:ln w="3175">
+            <a:solidFill>
+              <a:schemeClr val="tx1"/>
+            </a:solidFill>
+          </a:ln>
+        </p:spPr>
+      </p:pic>
+      <p:pic>
+        <p:nvPicPr>
+          <p:cNvPr id="13" name="Picture 12" descr="A screenshot of a computer&#10;&#10;Description automatically generated with medium confidence">
+            <a:extLst>
+              <a:ext uri="{FF2B5EF4-FFF2-40B4-BE49-F238E27FC236}">
+                <a16:creationId xmlns:a16="http://schemas.microsoft.com/office/drawing/2014/main" id="{8C0A3232-5D8A-AAB5-4F52-03DC6610B8C8}"/>
+              </a:ext>
+            </a:extLst>
+          </p:cNvPr>
+          <p:cNvPicPr>
+            <a:picLocks noChangeAspect="1"/>
+          </p:cNvPicPr>
+          <p:nvPr/>
+        </p:nvPicPr>
+        <p:blipFill>
+          <a:blip r:embed="rId5">
+            <a:extLst>
+              <a:ext uri="{28A0092B-C50C-407E-A947-70E740481C1C}">
+                <a14:useLocalDpi xmlns:a14="http://schemas.microsoft.com/office/drawing/2010/main" val="0"/>
+              </a:ext>
+            </a:extLst>
+          </a:blip>
+          <a:stretch>
+            <a:fillRect/>
+          </a:stretch>
+        </p:blipFill>
+        <p:spPr>
+          <a:xfrm>
+            <a:off x="285544" y="4050028"/>
+            <a:ext cx="4727584" cy="2560776"/>
+          </a:xfrm>
+          <a:prstGeom prst="rect">
+            <a:avLst/>
+          </a:prstGeom>
+          <a:ln w="3175">
+            <a:solidFill>
+              <a:schemeClr val="tx1"/>
+            </a:solidFill>
+          </a:ln>
+        </p:spPr>
+      </p:pic>
+      <p:sp>
+        <p:nvSpPr>
+          <p:cNvPr id="15" name="TextBox 14">
+            <a:extLst>
+              <a:ext uri="{FF2B5EF4-FFF2-40B4-BE49-F238E27FC236}">
+                <a16:creationId xmlns:a16="http://schemas.microsoft.com/office/drawing/2014/main" id="{D87DB038-14DB-C6C1-8F2D-2A641849954B}"/>
+              </a:ext>
+            </a:extLst>
+          </p:cNvPr>
+          <p:cNvSpPr txBox="1"/>
+          <p:nvPr/>
+        </p:nvSpPr>
+        <p:spPr>
+          <a:xfrm>
+            <a:off x="5248760" y="2241717"/>
+            <a:ext cx="4727589" cy="338554"/>
+          </a:xfrm>
+          <a:prstGeom prst="rect">
+            <a:avLst/>
+          </a:prstGeom>
+          <a:noFill/>
+        </p:spPr>
+        <p:txBody>
+          <a:bodyPr wrap="square" rtlCol="0">
+            <a:spAutoFit/>
+          </a:bodyPr>
+          <a:lstStyle/>
+          <a:p>
+            <a:pPr algn="just"/>
+            <a:r>
+              <a:rPr lang="en-SG" sz="1600" b="1" dirty="0"/>
+              <a:t>Network interrupt [16/11/2022] detection result</a:t>
+            </a:r>
+            <a:r>
+              <a:rPr lang="en-SG" sz="1600" dirty="0"/>
+              <a:t>:</a:t>
+            </a:r>
+          </a:p>
+        </p:txBody>
+      </p:sp>
+      <p:pic>
+        <p:nvPicPr>
+          <p:cNvPr id="17" name="Picture 16" descr="A screenshot of a computer&#10;&#10;Description automatically generated with medium confidence">
+            <a:extLst>
+              <a:ext uri="{FF2B5EF4-FFF2-40B4-BE49-F238E27FC236}">
+                <a16:creationId xmlns:a16="http://schemas.microsoft.com/office/drawing/2014/main" id="{BD862745-6C22-4C22-8261-159F4C05667F}"/>
+              </a:ext>
+            </a:extLst>
+          </p:cNvPr>
+          <p:cNvPicPr>
+            <a:picLocks noChangeAspect="1"/>
+          </p:cNvPicPr>
+          <p:nvPr/>
+        </p:nvPicPr>
+        <p:blipFill>
+          <a:blip r:embed="rId6">
+            <a:extLst>
+              <a:ext uri="{28A0092B-C50C-407E-A947-70E740481C1C}">
+                <a14:useLocalDpi xmlns:a14="http://schemas.microsoft.com/office/drawing/2010/main" val="0"/>
+              </a:ext>
+            </a:extLst>
+          </a:blip>
+          <a:stretch>
+            <a:fillRect/>
+          </a:stretch>
+        </p:blipFill>
+        <p:spPr>
+          <a:xfrm>
+            <a:off x="5330049" y="2724900"/>
+            <a:ext cx="4727588" cy="2560777"/>
+          </a:xfrm>
+          <a:prstGeom prst="rect">
+            <a:avLst/>
+          </a:prstGeom>
+          <a:ln w="3175">
+            <a:solidFill>
+              <a:schemeClr val="tx1"/>
+            </a:solidFill>
+          </a:ln>
+        </p:spPr>
+      </p:pic>
+      <p:sp>
+        <p:nvSpPr>
+          <p:cNvPr id="18" name="AutoShape 2">
+            <a:extLst>
+              <a:ext uri="{FF2B5EF4-FFF2-40B4-BE49-F238E27FC236}">
+                <a16:creationId xmlns:a16="http://schemas.microsoft.com/office/drawing/2014/main" id="{5CF00E81-516B-25AF-9B16-C62E0EE85E57}"/>
+              </a:ext>
+            </a:extLst>
+          </p:cNvPr>
+          <p:cNvSpPr>
+            <a:spLocks noChangeAspect="1" noChangeArrowheads="1"/>
+          </p:cNvSpPr>
+          <p:nvPr/>
+        </p:nvSpPr>
+        <p:spPr bwMode="auto">
+          <a:xfrm>
+            <a:off x="5810179" y="4995672"/>
+            <a:ext cx="304800" cy="304800"/>
+          </a:xfrm>
+          <a:prstGeom prst="rect">
+            <a:avLst/>
+          </a:prstGeom>
+          <a:noFill/>
+          <a:extLst>
+            <a:ext uri="{909E8E84-426E-40DD-AFC4-6F175D3DCCD1}">
+              <a14:hiddenFill xmlns:a14="http://schemas.microsoft.com/office/drawing/2010/main">
+                <a:solidFill>
+                  <a:srgbClr val="FFFFFF"/>
+                </a:solidFill>
+              </a14:hiddenFill>
+            </a:ext>
+          </a:extLst>
+        </p:spPr>
+        <p:txBody>
+          <a:bodyPr vert="horz" wrap="square" lIns="91440" tIns="45720" rIns="91440" bIns="45720" numCol="1" anchor="t" anchorCtr="0" compatLnSpc="1">
+            <a:prstTxWarp prst="textNoShape">
+              <a:avLst/>
+            </a:prstTxWarp>
+          </a:bodyPr>
+          <a:lstStyle/>
+          <a:p>
+            <a:endParaRPr lang="en-SG"/>
+          </a:p>
+        </p:txBody>
+      </p:sp>
+      <p:pic>
+        <p:nvPicPr>
+          <p:cNvPr id="20" name="Picture 19" descr="A screenshot of a text message&#10;&#10;Description automatically generated with medium confidence">
+            <a:extLst>
+              <a:ext uri="{FF2B5EF4-FFF2-40B4-BE49-F238E27FC236}">
+                <a16:creationId xmlns:a16="http://schemas.microsoft.com/office/drawing/2014/main" id="{FDECD6E9-8CAD-96A7-2E95-B668AFCD9B0C}"/>
+              </a:ext>
+            </a:extLst>
+          </p:cNvPr>
+          <p:cNvPicPr>
+            <a:picLocks noChangeAspect="1"/>
+          </p:cNvPicPr>
+          <p:nvPr/>
+        </p:nvPicPr>
+        <p:blipFill>
+          <a:blip r:embed="rId7">
+            <a:extLst>
+              <a:ext uri="{28A0092B-C50C-407E-A947-70E740481C1C}">
+                <a14:useLocalDpi xmlns:a14="http://schemas.microsoft.com/office/drawing/2010/main" val="0"/>
+              </a:ext>
+            </a:extLst>
+          </a:blip>
+          <a:stretch>
+            <a:fillRect/>
+          </a:stretch>
+        </p:blipFill>
+        <p:spPr>
+          <a:xfrm>
+            <a:off x="10148854" y="2362393"/>
+            <a:ext cx="1916607" cy="4144894"/>
+          </a:xfrm>
+          <a:prstGeom prst="rect">
+            <a:avLst/>
+          </a:prstGeom>
+          <a:ln>
+            <a:solidFill>
+              <a:schemeClr val="tx1"/>
+            </a:solidFill>
+          </a:ln>
+        </p:spPr>
+      </p:pic>
+      <p:sp>
+        <p:nvSpPr>
+          <p:cNvPr id="21" name="Rectangle 20">
+            <a:extLst>
+              <a:ext uri="{FF2B5EF4-FFF2-40B4-BE49-F238E27FC236}">
+                <a16:creationId xmlns:a16="http://schemas.microsoft.com/office/drawing/2014/main" id="{97A3701D-4301-EEE9-971C-D83B9EC620F3}"/>
+              </a:ext>
+            </a:extLst>
+          </p:cNvPr>
+          <p:cNvSpPr/>
+          <p:nvPr/>
+        </p:nvSpPr>
+        <p:spPr>
+          <a:xfrm>
+            <a:off x="7693843" y="3300984"/>
+            <a:ext cx="448056" cy="621792"/>
+          </a:xfrm>
+          <a:prstGeom prst="rect">
+            <a:avLst/>
+          </a:prstGeom>
+          <a:noFill/>
+          <a:ln>
+            <a:solidFill>
+              <a:srgbClr val="FF0000"/>
+            </a:solidFill>
+            <a:prstDash val="dash"/>
+          </a:ln>
+        </p:spPr>
+        <p:style>
+          <a:lnRef idx="2">
+            <a:schemeClr val="accent1">
+              <a:shade val="50000"/>
+            </a:schemeClr>
+          </a:lnRef>
+          <a:fillRef idx="1">
+            <a:schemeClr val="accent1"/>
+          </a:fillRef>
+          <a:effectRef idx="0">
+            <a:schemeClr val="accent1"/>
+          </a:effectRef>
+          <a:fontRef idx="minor">
+            <a:schemeClr val="lt1"/>
+          </a:fontRef>
+        </p:style>
+        <p:txBody>
+          <a:bodyPr rtlCol="0" anchor="ctr"/>
+          <a:lstStyle/>
+          <a:p>
+            <a:pPr algn="ctr"/>
+            <a:endParaRPr lang="en-SG" dirty="0"/>
+          </a:p>
+        </p:txBody>
+      </p:sp>
+      <p:sp>
+        <p:nvSpPr>
+          <p:cNvPr id="22" name="Rectangle 21">
+            <a:extLst>
+              <a:ext uri="{FF2B5EF4-FFF2-40B4-BE49-F238E27FC236}">
+                <a16:creationId xmlns:a16="http://schemas.microsoft.com/office/drawing/2014/main" id="{02B6B6A3-21FD-1ED4-23FF-1FE4681B758C}"/>
+              </a:ext>
+            </a:extLst>
+          </p:cNvPr>
+          <p:cNvSpPr/>
+          <p:nvPr/>
+        </p:nvSpPr>
+        <p:spPr>
+          <a:xfrm>
+            <a:off x="6194227" y="4151376"/>
+            <a:ext cx="429768" cy="813816"/>
+          </a:xfrm>
+          <a:prstGeom prst="rect">
+            <a:avLst/>
+          </a:prstGeom>
+          <a:noFill/>
+          <a:ln>
+            <a:solidFill>
+              <a:srgbClr val="FF0000"/>
+            </a:solidFill>
+            <a:prstDash val="dash"/>
+          </a:ln>
+        </p:spPr>
+        <p:style>
+          <a:lnRef idx="2">
+            <a:schemeClr val="accent1">
+              <a:shade val="50000"/>
+            </a:schemeClr>
+          </a:lnRef>
+          <a:fillRef idx="1">
+            <a:schemeClr val="accent1"/>
+          </a:fillRef>
+          <a:effectRef idx="0">
+            <a:schemeClr val="accent1"/>
+          </a:effectRef>
+          <a:fontRef idx="minor">
+            <a:schemeClr val="lt1"/>
+          </a:fontRef>
+        </p:style>
+        <p:txBody>
+          <a:bodyPr rtlCol="0" anchor="ctr"/>
+          <a:lstStyle/>
+          <a:p>
+            <a:pPr algn="ctr"/>
+            <a:endParaRPr lang="en-SG" dirty="0"/>
+          </a:p>
+        </p:txBody>
+      </p:sp>
+      <p:sp>
+        <p:nvSpPr>
+          <p:cNvPr id="23" name="Rectangle 22">
+            <a:extLst>
+              <a:ext uri="{FF2B5EF4-FFF2-40B4-BE49-F238E27FC236}">
+                <a16:creationId xmlns:a16="http://schemas.microsoft.com/office/drawing/2014/main" id="{0A1CC5D5-63BB-ABE0-4489-3D5E9FC0320A}"/>
+              </a:ext>
+            </a:extLst>
+          </p:cNvPr>
+          <p:cNvSpPr/>
+          <p:nvPr/>
+        </p:nvSpPr>
+        <p:spPr>
+          <a:xfrm>
+            <a:off x="7840145" y="4189476"/>
+            <a:ext cx="448056" cy="775716"/>
+          </a:xfrm>
+          <a:prstGeom prst="rect">
+            <a:avLst/>
+          </a:prstGeom>
+          <a:noFill/>
+          <a:ln>
+            <a:solidFill>
+              <a:srgbClr val="FF0000"/>
+            </a:solidFill>
+            <a:prstDash val="dash"/>
+          </a:ln>
+        </p:spPr>
+        <p:style>
+          <a:lnRef idx="2">
+            <a:schemeClr val="accent1">
+              <a:shade val="50000"/>
+            </a:schemeClr>
+          </a:lnRef>
+          <a:fillRef idx="1">
+            <a:schemeClr val="accent1"/>
+          </a:fillRef>
+          <a:effectRef idx="0">
+            <a:schemeClr val="accent1"/>
+          </a:effectRef>
+          <a:fontRef idx="minor">
+            <a:schemeClr val="lt1"/>
+          </a:fontRef>
+        </p:style>
+        <p:txBody>
+          <a:bodyPr rtlCol="0" anchor="ctr"/>
+          <a:lstStyle/>
+          <a:p>
+            <a:pPr algn="ctr"/>
+            <a:endParaRPr lang="en-SG" dirty="0"/>
+          </a:p>
+        </p:txBody>
+      </p:sp>
+      <p:sp>
+        <p:nvSpPr>
+          <p:cNvPr id="24" name="Rectangle 23">
+            <a:extLst>
+              <a:ext uri="{FF2B5EF4-FFF2-40B4-BE49-F238E27FC236}">
+                <a16:creationId xmlns:a16="http://schemas.microsoft.com/office/drawing/2014/main" id="{F7C7204F-946B-7013-2BD5-F3C668F4C72E}"/>
+              </a:ext>
+            </a:extLst>
+          </p:cNvPr>
+          <p:cNvSpPr/>
+          <p:nvPr/>
+        </p:nvSpPr>
+        <p:spPr>
+          <a:xfrm>
+            <a:off x="9272707" y="3236212"/>
+            <a:ext cx="429768" cy="813816"/>
+          </a:xfrm>
+          <a:prstGeom prst="rect">
+            <a:avLst/>
+          </a:prstGeom>
+          <a:noFill/>
+          <a:ln>
+            <a:solidFill>
+              <a:srgbClr val="FF0000"/>
+            </a:solidFill>
+            <a:prstDash val="dash"/>
+          </a:ln>
+        </p:spPr>
+        <p:style>
+          <a:lnRef idx="2">
+            <a:schemeClr val="accent1">
+              <a:shade val="50000"/>
+            </a:schemeClr>
+          </a:lnRef>
+          <a:fillRef idx="1">
+            <a:schemeClr val="accent1"/>
+          </a:fillRef>
+          <a:effectRef idx="0">
+            <a:schemeClr val="accent1"/>
+          </a:effectRef>
+          <a:fontRef idx="minor">
+            <a:schemeClr val="lt1"/>
+          </a:fontRef>
+        </p:style>
+        <p:txBody>
+          <a:bodyPr rtlCol="0" anchor="ctr"/>
+          <a:lstStyle/>
+          <a:p>
+            <a:pPr algn="ctr"/>
+            <a:endParaRPr lang="en-SG" dirty="0"/>
+          </a:p>
+        </p:txBody>
+      </p:sp>
+      <p:cxnSp>
+        <p:nvCxnSpPr>
+          <p:cNvPr id="26" name="Connector: Elbow 25">
+            <a:extLst>
+              <a:ext uri="{FF2B5EF4-FFF2-40B4-BE49-F238E27FC236}">
+                <a16:creationId xmlns:a16="http://schemas.microsoft.com/office/drawing/2014/main" id="{F55BA157-E33C-B84C-35FB-19AA980EE433}"/>
+              </a:ext>
+            </a:extLst>
+          </p:cNvPr>
+          <p:cNvCxnSpPr>
+            <a:cxnSpLocks/>
+            <a:stCxn id="22" idx="2"/>
+          </p:cNvCxnSpPr>
+          <p:nvPr/>
+        </p:nvCxnSpPr>
+        <p:spPr>
+          <a:xfrm rot="16200000" flipH="1">
+            <a:off x="7849645" y="3524657"/>
+            <a:ext cx="1024128" cy="3905197"/>
+          </a:xfrm>
+          <a:prstGeom prst="bentConnector2">
+            <a:avLst/>
+          </a:prstGeom>
+          <a:ln>
+            <a:solidFill>
+              <a:srgbClr val="FF0000"/>
+            </a:solidFill>
+            <a:prstDash val="dash"/>
+            <a:tailEnd type="triangle"/>
+          </a:ln>
+        </p:spPr>
+        <p:style>
+          <a:lnRef idx="1">
+            <a:schemeClr val="accent1"/>
+          </a:lnRef>
+          <a:fillRef idx="0">
+            <a:schemeClr val="accent1"/>
+          </a:fillRef>
+          <a:effectRef idx="0">
+            <a:schemeClr val="accent1"/>
+          </a:effectRef>
+          <a:fontRef idx="minor">
+            <a:schemeClr val="tx1"/>
+          </a:fontRef>
+        </p:style>
+      </p:cxnSp>
+      <p:cxnSp>
+        <p:nvCxnSpPr>
+          <p:cNvPr id="28" name="Straight Arrow Connector 27">
+            <a:extLst>
+              <a:ext uri="{FF2B5EF4-FFF2-40B4-BE49-F238E27FC236}">
+                <a16:creationId xmlns:a16="http://schemas.microsoft.com/office/drawing/2014/main" id="{EBEFF42D-C3CB-61E2-2FBD-15E260B80F77}"/>
+              </a:ext>
+            </a:extLst>
+          </p:cNvPr>
+          <p:cNvCxnSpPr>
+            <a:cxnSpLocks/>
+          </p:cNvCxnSpPr>
+          <p:nvPr/>
+        </p:nvCxnSpPr>
+        <p:spPr>
+          <a:xfrm>
+            <a:off x="9504355" y="4050028"/>
+            <a:ext cx="0" cy="1939292"/>
+          </a:xfrm>
+          <a:prstGeom prst="straightConnector1">
+            <a:avLst/>
+          </a:prstGeom>
+          <a:ln>
+            <a:solidFill>
+              <a:srgbClr val="FF0000"/>
+            </a:solidFill>
+            <a:prstDash val="dash"/>
+            <a:tailEnd type="triangle"/>
+          </a:ln>
+        </p:spPr>
+        <p:style>
+          <a:lnRef idx="1">
+            <a:schemeClr val="accent1"/>
+          </a:lnRef>
+          <a:fillRef idx="0">
+            <a:schemeClr val="accent1"/>
+          </a:fillRef>
+          <a:effectRef idx="0">
+            <a:schemeClr val="accent1"/>
+          </a:effectRef>
+          <a:fontRef idx="minor">
+            <a:schemeClr val="tx1"/>
+          </a:fontRef>
+        </p:style>
+      </p:cxnSp>
+      <p:cxnSp>
+        <p:nvCxnSpPr>
+          <p:cNvPr id="34" name="Straight Arrow Connector 33">
+            <a:extLst>
+              <a:ext uri="{FF2B5EF4-FFF2-40B4-BE49-F238E27FC236}">
+                <a16:creationId xmlns:a16="http://schemas.microsoft.com/office/drawing/2014/main" id="{55C0BAC8-68B5-A790-ABB9-4B7EF9175A12}"/>
+              </a:ext>
+            </a:extLst>
+          </p:cNvPr>
+          <p:cNvCxnSpPr>
+            <a:cxnSpLocks/>
+          </p:cNvCxnSpPr>
+          <p:nvPr/>
+        </p:nvCxnSpPr>
+        <p:spPr>
+          <a:xfrm>
+            <a:off x="7910251" y="4950771"/>
+            <a:ext cx="0" cy="1038549"/>
+          </a:xfrm>
+          <a:prstGeom prst="straightConnector1">
+            <a:avLst/>
+          </a:prstGeom>
+          <a:ln>
+            <a:solidFill>
+              <a:srgbClr val="FF0000"/>
+            </a:solidFill>
+            <a:prstDash val="dash"/>
+            <a:tailEnd type="triangle"/>
+          </a:ln>
+        </p:spPr>
+        <p:style>
+          <a:lnRef idx="1">
+            <a:schemeClr val="accent1"/>
+          </a:lnRef>
+          <a:fillRef idx="0">
+            <a:schemeClr val="accent1"/>
+          </a:fillRef>
+          <a:effectRef idx="0">
+            <a:schemeClr val="accent1"/>
+          </a:effectRef>
+          <a:fontRef idx="minor">
+            <a:schemeClr val="tx1"/>
+          </a:fontRef>
+        </p:style>
+      </p:cxnSp>
+      <p:cxnSp>
+        <p:nvCxnSpPr>
+          <p:cNvPr id="38" name="Connector: Elbow 37">
+            <a:extLst>
+              <a:ext uri="{FF2B5EF4-FFF2-40B4-BE49-F238E27FC236}">
+                <a16:creationId xmlns:a16="http://schemas.microsoft.com/office/drawing/2014/main" id="{3E76D107-0B4C-3487-3A5A-F813239FE029}"/>
+              </a:ext>
+            </a:extLst>
+          </p:cNvPr>
+          <p:cNvCxnSpPr>
+            <a:cxnSpLocks/>
+          </p:cNvCxnSpPr>
+          <p:nvPr/>
+        </p:nvCxnSpPr>
+        <p:spPr>
+          <a:xfrm rot="16200000" flipH="1">
+            <a:off x="8123799" y="3648267"/>
+            <a:ext cx="2166821" cy="2130621"/>
+          </a:xfrm>
+          <a:prstGeom prst="bentConnector3">
+            <a:avLst>
+              <a:gd name="adj1" fmla="val 99796"/>
+            </a:avLst>
+          </a:prstGeom>
+          <a:ln>
+            <a:solidFill>
+              <a:srgbClr val="FF0000"/>
+            </a:solidFill>
+            <a:prstDash val="dash"/>
+            <a:tailEnd type="triangle"/>
+          </a:ln>
+        </p:spPr>
+        <p:style>
+          <a:lnRef idx="1">
+            <a:schemeClr val="accent1"/>
+          </a:lnRef>
+          <a:fillRef idx="0">
+            <a:schemeClr val="accent1"/>
+          </a:fillRef>
+          <a:effectRef idx="0">
+            <a:schemeClr val="accent1"/>
+          </a:effectRef>
+          <a:fontRef idx="minor">
+            <a:schemeClr val="tx1"/>
+          </a:fontRef>
+        </p:style>
+      </p:cxnSp>
+      <p:sp>
+        <p:nvSpPr>
+          <p:cNvPr id="46" name="TextBox 45">
+            <a:extLst>
+              <a:ext uri="{FF2B5EF4-FFF2-40B4-BE49-F238E27FC236}">
+                <a16:creationId xmlns:a16="http://schemas.microsoft.com/office/drawing/2014/main" id="{81EBB901-7AE6-F03A-A519-41C66844B203}"/>
+              </a:ext>
+            </a:extLst>
+          </p:cNvPr>
+          <p:cNvSpPr txBox="1"/>
+          <p:nvPr/>
+        </p:nvSpPr>
+        <p:spPr>
+          <a:xfrm>
+            <a:off x="5363765" y="6063688"/>
+            <a:ext cx="4447745" cy="800219"/>
+          </a:xfrm>
+          <a:prstGeom prst="rect">
+            <a:avLst/>
+          </a:prstGeom>
+          <a:noFill/>
+        </p:spPr>
+        <p:txBody>
+          <a:bodyPr wrap="square" rtlCol="0">
+            <a:spAutoFit/>
+          </a:bodyPr>
+          <a:lstStyle/>
+          <a:p>
+            <a:pPr algn="just"/>
+            <a:r>
+              <a:rPr lang="en-SG" sz="1600" dirty="0"/>
+              <a:t>Network interrupt time:</a:t>
+            </a:r>
+          </a:p>
+          <a:p>
+            <a:pPr algn="just"/>
+            <a:r>
+              <a:rPr lang="en-US" sz="1400" dirty="0"/>
+              <a:t>ITU reported the started at 2:16 pm and they started to recover at 2:20pm</a:t>
+            </a:r>
+            <a:r>
+              <a:rPr lang="en-SG" sz="1600" dirty="0"/>
+              <a:t>. </a:t>
+            </a:r>
+          </a:p>
+        </p:txBody>
+      </p:sp>
+      <p:sp>
+        <p:nvSpPr>
+          <p:cNvPr id="47" name="Rectangle 46">
+            <a:extLst>
+              <a:ext uri="{FF2B5EF4-FFF2-40B4-BE49-F238E27FC236}">
+                <a16:creationId xmlns:a16="http://schemas.microsoft.com/office/drawing/2014/main" id="{B4252A64-2B30-8034-E049-708B1800E27D}"/>
+              </a:ext>
+            </a:extLst>
+          </p:cNvPr>
+          <p:cNvSpPr/>
+          <p:nvPr/>
+        </p:nvSpPr>
+        <p:spPr>
+          <a:xfrm>
+            <a:off x="3026664" y="4434840"/>
+            <a:ext cx="182880" cy="713232"/>
+          </a:xfrm>
+          <a:prstGeom prst="rect">
+            <a:avLst/>
+          </a:prstGeom>
+          <a:noFill/>
+          <a:ln>
+            <a:solidFill>
+              <a:srgbClr val="FF0000"/>
+            </a:solidFill>
+            <a:prstDash val="sysDash"/>
+          </a:ln>
+        </p:spPr>
+        <p:style>
+          <a:lnRef idx="2">
+            <a:schemeClr val="accent1">
+              <a:shade val="50000"/>
+            </a:schemeClr>
+          </a:lnRef>
+          <a:fillRef idx="1">
+            <a:schemeClr val="accent1"/>
+          </a:fillRef>
+          <a:effectRef idx="0">
+            <a:schemeClr val="accent1"/>
+          </a:effectRef>
+          <a:fontRef idx="minor">
+            <a:schemeClr val="lt1"/>
+          </a:fontRef>
+        </p:style>
+        <p:txBody>
+          <a:bodyPr rtlCol="0" anchor="ctr"/>
+          <a:lstStyle/>
+          <a:p>
+            <a:pPr algn="ctr"/>
+            <a:endParaRPr lang="en-SG" dirty="0"/>
+          </a:p>
+        </p:txBody>
+      </p:sp>
+      <p:sp>
+        <p:nvSpPr>
+          <p:cNvPr id="49" name="TextBox 48">
+            <a:extLst>
+              <a:ext uri="{FF2B5EF4-FFF2-40B4-BE49-F238E27FC236}">
+                <a16:creationId xmlns:a16="http://schemas.microsoft.com/office/drawing/2014/main" id="{EE0410FA-5167-7552-2F0D-82DC82B37232}"/>
+              </a:ext>
+            </a:extLst>
+          </p:cNvPr>
+          <p:cNvSpPr txBox="1"/>
+          <p:nvPr/>
+        </p:nvSpPr>
+        <p:spPr>
+          <a:xfrm>
+            <a:off x="307560" y="697921"/>
+            <a:ext cx="4508722" cy="338554"/>
+          </a:xfrm>
+          <a:prstGeom prst="rect">
+            <a:avLst/>
+          </a:prstGeom>
+          <a:noFill/>
+        </p:spPr>
+        <p:txBody>
+          <a:bodyPr wrap="square">
+            <a:spAutoFit/>
+          </a:bodyPr>
+          <a:lstStyle/>
+          <a:p>
+            <a:r>
+              <a:rPr lang="en-SG" sz="1600" dirty="0"/>
+              <a:t>Event day-1 [15/11/2022] entire ping latency chart: </a:t>
+            </a:r>
+          </a:p>
+        </p:txBody>
+      </p:sp>
+      <p:sp>
+        <p:nvSpPr>
+          <p:cNvPr id="50" name="TextBox 49">
+            <a:extLst>
+              <a:ext uri="{FF2B5EF4-FFF2-40B4-BE49-F238E27FC236}">
+                <a16:creationId xmlns:a16="http://schemas.microsoft.com/office/drawing/2014/main" id="{78693D23-A6AB-49EE-D748-DFE53F8E437E}"/>
+              </a:ext>
+            </a:extLst>
+          </p:cNvPr>
+          <p:cNvSpPr txBox="1"/>
+          <p:nvPr/>
+        </p:nvSpPr>
+        <p:spPr>
+          <a:xfrm>
+            <a:off x="204190" y="3669668"/>
+            <a:ext cx="6144768" cy="338554"/>
+          </a:xfrm>
+          <a:prstGeom prst="rect">
+            <a:avLst/>
+          </a:prstGeom>
+          <a:noFill/>
+        </p:spPr>
+        <p:txBody>
+          <a:bodyPr wrap="square">
+            <a:spAutoFit/>
+          </a:bodyPr>
+          <a:lstStyle/>
+          <a:p>
+            <a:r>
+              <a:rPr lang="en-SG" sz="1600" dirty="0"/>
+              <a:t>Event day-2 [16/11/2022] entire ping latency chart: </a:t>
+            </a:r>
+          </a:p>
+        </p:txBody>
+      </p:sp>
+    </p:spTree>
+    <p:extLst>
+      <p:ext uri="{BB962C8B-B14F-4D97-AF65-F5344CB8AC3E}">
+        <p14:creationId xmlns:p14="http://schemas.microsoft.com/office/powerpoint/2010/main" val="4179204438"/>
+      </p:ext>
+    </p:extLst>
+  </p:cSld>
+  <p:clrMapOvr>
+    <a:masterClrMapping/>
+  </p:clrMapOvr>
+</p:sld>
+</file>
+
+<file path=ppt/slides/slide3.xml><?xml version="1.0" encoding="utf-8"?>
+<p:sld xmlns:a="http://schemas.openxmlformats.org/drawingml/2006/main" xmlns:r="http://schemas.openxmlformats.org/officeDocument/2006/relationships" xmlns:p="http://schemas.openxmlformats.org/presentationml/2006/main">
+  <p:cSld>
+    <p:spTree>
+      <p:nvGrpSpPr>
+        <p:cNvPr id="1" name=""/>
+        <p:cNvGrpSpPr/>
+        <p:nvPr/>
+      </p:nvGrpSpPr>
+      <p:grpSpPr>
+        <a:xfrm>
+          <a:off x="0" y="0"/>
+          <a:ext cx="0" cy="0"/>
+          <a:chOff x="0" y="0"/>
+          <a:chExt cx="0" cy="0"/>
+        </a:xfrm>
+      </p:grpSpPr>
     </p:spTree>
     <p:extLst>
       <p:ext uri="{BB962C8B-B14F-4D97-AF65-F5344CB8AC3E}">
@@ -7529,4 +9006,319 @@
     </a:ext>
   </a:extLst>
 </a:theme>
+</file>
+
+<file path=ppt/theme/theme2.xml><?xml version="1.0" encoding="utf-8"?>
+<a:theme xmlns:a="http://schemas.openxmlformats.org/drawingml/2006/main" name="Office Theme">
+  <a:themeElements>
+    <a:clrScheme name="Office">
+      <a:dk1>
+        <a:sysClr val="windowText" lastClr="000000"/>
+      </a:dk1>
+      <a:lt1>
+        <a:sysClr val="window" lastClr="FFFFFF"/>
+      </a:lt1>
+      <a:dk2>
+        <a:srgbClr val="0E2841"/>
+      </a:dk2>
+      <a:lt2>
+        <a:srgbClr val="E8E8E8"/>
+      </a:lt2>
+      <a:accent1>
+        <a:srgbClr val="156082"/>
+      </a:accent1>
+      <a:accent2>
+        <a:srgbClr val="E97132"/>
+      </a:accent2>
+      <a:accent3>
+        <a:srgbClr val="196B24"/>
+      </a:accent3>
+      <a:accent4>
+        <a:srgbClr val="0F9ED5"/>
+      </a:accent4>
+      <a:accent5>
+        <a:srgbClr val="A02B93"/>
+      </a:accent5>
+      <a:accent6>
+        <a:srgbClr val="4EA72E"/>
+      </a:accent6>
+      <a:hlink>
+        <a:srgbClr val="467886"/>
+      </a:hlink>
+      <a:folHlink>
+        <a:srgbClr val="96607D"/>
+      </a:folHlink>
+    </a:clrScheme>
+    <a:fontScheme name="Office">
+      <a:majorFont>
+        <a:latin typeface="Aptos Display" panose="02110004020202020204"/>
+        <a:ea typeface=""/>
+        <a:cs typeface=""/>
+        <a:font script="Jpan" typeface="游ゴシック Light"/>
+        <a:font script="Hang" typeface="맑은 고딕"/>
+        <a:font script="Hans" typeface="等线 Light"/>
+        <a:font script="Hant" typeface="新細明體"/>
+        <a:font script="Arab" typeface="Times New Roman"/>
+        <a:font script="Hebr" typeface="Times New Roman"/>
+        <a:font script="Thai" typeface="Angsana New"/>
+        <a:font script="Ethi" typeface="Nyala"/>
+        <a:font script="Beng" typeface="Vrinda"/>
+        <a:font script="Gujr" typeface="Shruti"/>
+        <a:font script="Khmr" typeface="MoolBoran"/>
+        <a:font script="Knda" typeface="Tunga"/>
+        <a:font script="Guru" typeface="Raavi"/>
+        <a:font script="Cans" typeface="Euphemia"/>
+        <a:font script="Cher" typeface="Plantagenet Cherokee"/>
+        <a:font script="Yiii" typeface="Microsoft Yi Baiti"/>
+        <a:font script="Tibt" typeface="Microsoft Himalaya"/>
+        <a:font script="Thaa" typeface="MV Boli"/>
+        <a:font script="Deva" typeface="Mangal"/>
+        <a:font script="Telu" typeface="Gautami"/>
+        <a:font script="Taml" typeface="Latha"/>
+        <a:font script="Syrc" typeface="Estrangelo Edessa"/>
+        <a:font script="Orya" typeface="Kalinga"/>
+        <a:font script="Mlym" typeface="Kartika"/>
+        <a:font script="Laoo" typeface="DokChampa"/>
+        <a:font script="Sinh" typeface="Iskoola Pota"/>
+        <a:font script="Mong" typeface="Mongolian Baiti"/>
+        <a:font script="Viet" typeface="Times New Roman"/>
+        <a:font script="Uigh" typeface="Microsoft Uighur"/>
+        <a:font script="Geor" typeface="Sylfaen"/>
+        <a:font script="Armn" typeface="Arial"/>
+        <a:font script="Bugi" typeface="Leelawadee UI"/>
+        <a:font script="Bopo" typeface="Microsoft JhengHei"/>
+        <a:font script="Java" typeface="Javanese Text"/>
+        <a:font script="Lisu" typeface="Segoe UI"/>
+        <a:font script="Mymr" typeface="Myanmar Text"/>
+        <a:font script="Nkoo" typeface="Ebrima"/>
+        <a:font script="Olck" typeface="Nirmala UI"/>
+        <a:font script="Osma" typeface="Ebrima"/>
+        <a:font script="Phag" typeface="Phagspa"/>
+        <a:font script="Syrn" typeface="Estrangelo Edessa"/>
+        <a:font script="Syrj" typeface="Estrangelo Edessa"/>
+        <a:font script="Syre" typeface="Estrangelo Edessa"/>
+        <a:font script="Sora" typeface="Nirmala UI"/>
+        <a:font script="Tale" typeface="Microsoft Tai Le"/>
+        <a:font script="Talu" typeface="Microsoft New Tai Lue"/>
+        <a:font script="Tfng" typeface="Ebrima"/>
+      </a:majorFont>
+      <a:minorFont>
+        <a:latin typeface="Aptos" panose="02110004020202020204"/>
+        <a:ea typeface=""/>
+        <a:cs typeface=""/>
+        <a:font script="Jpan" typeface="游ゴシック"/>
+        <a:font script="Hang" typeface="맑은 고딕"/>
+        <a:font script="Hans" typeface="等线"/>
+        <a:font script="Hant" typeface="新細明體"/>
+        <a:font script="Arab" typeface="Arial"/>
+        <a:font script="Hebr" typeface="Arial"/>
+        <a:font script="Thai" typeface="Cordia New"/>
+        <a:font script="Ethi" typeface="Nyala"/>
+        <a:font script="Beng" typeface="Vrinda"/>
+        <a:font script="Gujr" typeface="Shruti"/>
+        <a:font script="Khmr" typeface="DaunPenh"/>
+        <a:font script="Knda" typeface="Tunga"/>
+        <a:font script="Guru" typeface="Raavi"/>
+        <a:font script="Cans" typeface="Euphemia"/>
+        <a:font script="Cher" typeface="Plantagenet Cherokee"/>
+        <a:font script="Yiii" typeface="Microsoft Yi Baiti"/>
+        <a:font script="Tibt" typeface="Microsoft Himalaya"/>
+        <a:font script="Thaa" typeface="MV Boli"/>
+        <a:font script="Deva" typeface="Mangal"/>
+        <a:font script="Telu" typeface="Gautami"/>
+        <a:font script="Taml" typeface="Latha"/>
+        <a:font script="Syrc" typeface="Estrangelo Edessa"/>
+        <a:font script="Orya" typeface="Kalinga"/>
+        <a:font script="Mlym" typeface="Kartika"/>
+        <a:font script="Laoo" typeface="DokChampa"/>
+        <a:font script="Sinh" typeface="Iskoola Pota"/>
+        <a:font script="Mong" typeface="Mongolian Baiti"/>
+        <a:font script="Viet" typeface="Arial"/>
+        <a:font script="Uigh" typeface="Microsoft Uighur"/>
+        <a:font script="Geor" typeface="Sylfaen"/>
+        <a:font script="Armn" typeface="Arial"/>
+        <a:font script="Bugi" typeface="Leelawadee UI"/>
+        <a:font script="Bopo" typeface="Microsoft JhengHei"/>
+        <a:font script="Java" typeface="Javanese Text"/>
+        <a:font script="Lisu" typeface="Segoe UI"/>
+        <a:font script="Mymr" typeface="Myanmar Text"/>
+        <a:font script="Nkoo" typeface="Ebrima"/>
+        <a:font script="Olck" typeface="Nirmala UI"/>
+        <a:font script="Osma" typeface="Ebrima"/>
+        <a:font script="Phag" typeface="Phagspa"/>
+        <a:font script="Syrn" typeface="Estrangelo Edessa"/>
+        <a:font script="Syrj" typeface="Estrangelo Edessa"/>
+        <a:font script="Syre" typeface="Estrangelo Edessa"/>
+        <a:font script="Sora" typeface="Nirmala UI"/>
+        <a:font script="Tale" typeface="Microsoft Tai Le"/>
+        <a:font script="Talu" typeface="Microsoft New Tai Lue"/>
+        <a:font script="Tfng" typeface="Ebrima"/>
+      </a:minorFont>
+    </a:fontScheme>
+    <a:fmtScheme name="Office">
+      <a:fillStyleLst>
+        <a:solidFill>
+          <a:schemeClr val="phClr"/>
+        </a:solidFill>
+        <a:gradFill rotWithShape="1">
+          <a:gsLst>
+            <a:gs pos="0">
+              <a:schemeClr val="phClr">
+                <a:lumMod val="110000"/>
+                <a:satMod val="105000"/>
+                <a:tint val="67000"/>
+              </a:schemeClr>
+            </a:gs>
+            <a:gs pos="50000">
+              <a:schemeClr val="phClr">
+                <a:lumMod val="105000"/>
+                <a:satMod val="103000"/>
+                <a:tint val="73000"/>
+              </a:schemeClr>
+            </a:gs>
+            <a:gs pos="100000">
+              <a:schemeClr val="phClr">
+                <a:lumMod val="105000"/>
+                <a:satMod val="109000"/>
+                <a:tint val="81000"/>
+              </a:schemeClr>
+            </a:gs>
+          </a:gsLst>
+          <a:lin ang="5400000" scaled="0"/>
+        </a:gradFill>
+        <a:gradFill rotWithShape="1">
+          <a:gsLst>
+            <a:gs pos="0">
+              <a:schemeClr val="phClr">
+                <a:satMod val="103000"/>
+                <a:lumMod val="102000"/>
+                <a:tint val="94000"/>
+              </a:schemeClr>
+            </a:gs>
+            <a:gs pos="50000">
+              <a:schemeClr val="phClr">
+                <a:satMod val="110000"/>
+                <a:lumMod val="100000"/>
+                <a:shade val="100000"/>
+              </a:schemeClr>
+            </a:gs>
+            <a:gs pos="100000">
+              <a:schemeClr val="phClr">
+                <a:lumMod val="99000"/>
+                <a:satMod val="120000"/>
+                <a:shade val="78000"/>
+              </a:schemeClr>
+            </a:gs>
+          </a:gsLst>
+          <a:lin ang="5400000" scaled="0"/>
+        </a:gradFill>
+      </a:fillStyleLst>
+      <a:lnStyleLst>
+        <a:ln w="12700" cap="flat" cmpd="sng" algn="ctr">
+          <a:solidFill>
+            <a:schemeClr val="phClr"/>
+          </a:solidFill>
+          <a:prstDash val="solid"/>
+          <a:miter lim="800000"/>
+        </a:ln>
+        <a:ln w="19050" cap="flat" cmpd="sng" algn="ctr">
+          <a:solidFill>
+            <a:schemeClr val="phClr"/>
+          </a:solidFill>
+          <a:prstDash val="solid"/>
+          <a:miter lim="800000"/>
+        </a:ln>
+        <a:ln w="25400" cap="flat" cmpd="sng" algn="ctr">
+          <a:solidFill>
+            <a:schemeClr val="phClr"/>
+          </a:solidFill>
+          <a:prstDash val="solid"/>
+          <a:miter lim="800000"/>
+        </a:ln>
+      </a:lnStyleLst>
+      <a:effectStyleLst>
+        <a:effectStyle>
+          <a:effectLst/>
+        </a:effectStyle>
+        <a:effectStyle>
+          <a:effectLst/>
+        </a:effectStyle>
+        <a:effectStyle>
+          <a:effectLst>
+            <a:outerShdw blurRad="57150" dist="19050" dir="5400000" algn="ctr" rotWithShape="0">
+              <a:srgbClr val="000000">
+                <a:alpha val="63000"/>
+              </a:srgbClr>
+            </a:outerShdw>
+          </a:effectLst>
+        </a:effectStyle>
+      </a:effectStyleLst>
+      <a:bgFillStyleLst>
+        <a:solidFill>
+          <a:schemeClr val="phClr"/>
+        </a:solidFill>
+        <a:solidFill>
+          <a:schemeClr val="phClr">
+            <a:tint val="95000"/>
+            <a:satMod val="170000"/>
+          </a:schemeClr>
+        </a:solidFill>
+        <a:gradFill rotWithShape="1">
+          <a:gsLst>
+            <a:gs pos="0">
+              <a:schemeClr val="phClr">
+                <a:tint val="93000"/>
+                <a:satMod val="150000"/>
+                <a:shade val="98000"/>
+                <a:lumMod val="102000"/>
+              </a:schemeClr>
+            </a:gs>
+            <a:gs pos="50000">
+              <a:schemeClr val="phClr">
+                <a:tint val="98000"/>
+                <a:satMod val="130000"/>
+                <a:shade val="90000"/>
+                <a:lumMod val="103000"/>
+              </a:schemeClr>
+            </a:gs>
+            <a:gs pos="100000">
+              <a:schemeClr val="phClr">
+                <a:shade val="63000"/>
+                <a:satMod val="120000"/>
+              </a:schemeClr>
+            </a:gs>
+          </a:gsLst>
+          <a:lin ang="5400000" scaled="0"/>
+        </a:gradFill>
+      </a:bgFillStyleLst>
+    </a:fmtScheme>
+  </a:themeElements>
+  <a:objectDefaults>
+    <a:lnDef>
+      <a:spPr/>
+      <a:bodyPr/>
+      <a:lstStyle/>
+      <a:style>
+        <a:lnRef idx="2">
+          <a:schemeClr val="accent1"/>
+        </a:lnRef>
+        <a:fillRef idx="0">
+          <a:schemeClr val="accent1"/>
+        </a:fillRef>
+        <a:effectRef idx="1">
+          <a:schemeClr val="accent1"/>
+        </a:effectRef>
+        <a:fontRef idx="minor">
+          <a:schemeClr val="tx1"/>
+        </a:fontRef>
+      </a:style>
+    </a:lnDef>
+  </a:objectDefaults>
+  <a:extraClrSchemeLst/>
+  <a:extLst>
+    <a:ext uri="{05A4C25C-085E-4340-85A3-A5531E510DB2}">
+      <thm15:themeFamily xmlns:thm15="http://schemas.microsoft.com/office/thememl/2012/main" name="Office Theme" id="{2E142A2C-CD16-42D6-873A-C26D2A0506FA}" vid="{1BDDFF52-6CD6-40A5-AB3C-68EB2F1E4D0A}"/>
+    </a:ext>
+  </a:extLst>
+</a:theme>
 </file>
</xml_diff>